<commit_message>
updated test and images for launch
</commit_message>
<xml_diff>
--- a/images/general/topology.pptx
+++ b/images/general/topology.pptx
@@ -6,6 +6,7 @@
   </p:sldMasterIdLst>
   <p:sldIdLst>
     <p:sldId id="256" r:id="rId2"/>
+    <p:sldId id="257" r:id="rId3"/>
   </p:sldIdLst>
   <p:sldSz cx="12192000" cy="6858000"/>
   <p:notesSz cx="6858000" cy="9144000"/>
@@ -104,6 +105,11 @@
       </a:defRPr>
     </a:lvl9pPr>
   </p:defaultTextStyle>
+  <p:extLst>
+    <p:ext uri="{EFAFB233-063F-42B5-8137-9DF3F51BA10A}">
+      <p15:sldGuideLst xmlns:p15="http://schemas.microsoft.com/office/powerpoint/2012/main"/>
+    </p:ext>
+  </p:extLst>
 </p:presentation>
 </file>
 
@@ -238,7 +244,7 @@
           <a:p>
             <a:fld id="{16F386C7-051B-5D4C-B39C-D23C5C9820E1}" type="datetimeFigureOut">
               <a:rPr lang="en-US" smtClean="0"/>
-              <a:t>3/24/17</a:t>
+              <a:t>4/6/17</a:t>
             </a:fld>
             <a:endParaRPr lang="en-US"/>
           </a:p>
@@ -408,7 +414,7 @@
           <a:p>
             <a:fld id="{16F386C7-051B-5D4C-B39C-D23C5C9820E1}" type="datetimeFigureOut">
               <a:rPr lang="en-US" smtClean="0"/>
-              <a:t>3/24/17</a:t>
+              <a:t>4/6/17</a:t>
             </a:fld>
             <a:endParaRPr lang="en-US"/>
           </a:p>
@@ -588,7 +594,7 @@
           <a:p>
             <a:fld id="{16F386C7-051B-5D4C-B39C-D23C5C9820E1}" type="datetimeFigureOut">
               <a:rPr lang="en-US" smtClean="0"/>
-              <a:t>3/24/17</a:t>
+              <a:t>4/6/17</a:t>
             </a:fld>
             <a:endParaRPr lang="en-US"/>
           </a:p>
@@ -758,7 +764,7 @@
           <a:p>
             <a:fld id="{16F386C7-051B-5D4C-B39C-D23C5C9820E1}" type="datetimeFigureOut">
               <a:rPr lang="en-US" smtClean="0"/>
-              <a:t>3/24/17</a:t>
+              <a:t>4/6/17</a:t>
             </a:fld>
             <a:endParaRPr lang="en-US"/>
           </a:p>
@@ -1004,7 +1010,7 @@
           <a:p>
             <a:fld id="{16F386C7-051B-5D4C-B39C-D23C5C9820E1}" type="datetimeFigureOut">
               <a:rPr lang="en-US" smtClean="0"/>
-              <a:t>3/24/17</a:t>
+              <a:t>4/6/17</a:t>
             </a:fld>
             <a:endParaRPr lang="en-US"/>
           </a:p>
@@ -1236,7 +1242,7 @@
           <a:p>
             <a:fld id="{16F386C7-051B-5D4C-B39C-D23C5C9820E1}" type="datetimeFigureOut">
               <a:rPr lang="en-US" smtClean="0"/>
-              <a:t>3/24/17</a:t>
+              <a:t>4/6/17</a:t>
             </a:fld>
             <a:endParaRPr lang="en-US"/>
           </a:p>
@@ -1603,7 +1609,7 @@
           <a:p>
             <a:fld id="{16F386C7-051B-5D4C-B39C-D23C5C9820E1}" type="datetimeFigureOut">
               <a:rPr lang="en-US" smtClean="0"/>
-              <a:t>3/24/17</a:t>
+              <a:t>4/6/17</a:t>
             </a:fld>
             <a:endParaRPr lang="en-US"/>
           </a:p>
@@ -1721,7 +1727,7 @@
           <a:p>
             <a:fld id="{16F386C7-051B-5D4C-B39C-D23C5C9820E1}" type="datetimeFigureOut">
               <a:rPr lang="en-US" smtClean="0"/>
-              <a:t>3/24/17</a:t>
+              <a:t>4/6/17</a:t>
             </a:fld>
             <a:endParaRPr lang="en-US"/>
           </a:p>
@@ -1816,7 +1822,7 @@
           <a:p>
             <a:fld id="{16F386C7-051B-5D4C-B39C-D23C5C9820E1}" type="datetimeFigureOut">
               <a:rPr lang="en-US" smtClean="0"/>
-              <a:t>3/24/17</a:t>
+              <a:t>4/6/17</a:t>
             </a:fld>
             <a:endParaRPr lang="en-US"/>
           </a:p>
@@ -2093,7 +2099,7 @@
           <a:p>
             <a:fld id="{16F386C7-051B-5D4C-B39C-D23C5C9820E1}" type="datetimeFigureOut">
               <a:rPr lang="en-US" smtClean="0"/>
-              <a:t>3/24/17</a:t>
+              <a:t>4/6/17</a:t>
             </a:fld>
             <a:endParaRPr lang="en-US"/>
           </a:p>
@@ -2346,7 +2352,7 @@
           <a:p>
             <a:fld id="{16F386C7-051B-5D4C-B39C-D23C5C9820E1}" type="datetimeFigureOut">
               <a:rPr lang="en-US" smtClean="0"/>
-              <a:t>3/24/17</a:t>
+              <a:t>4/6/17</a:t>
             </a:fld>
             <a:endParaRPr lang="en-US"/>
           </a:p>
@@ -2559,7 +2565,7 @@
           <a:p>
             <a:fld id="{16F386C7-051B-5D4C-B39C-D23C5C9820E1}" type="datetimeFigureOut">
               <a:rPr lang="en-US" smtClean="0"/>
-              <a:t>3/24/17</a:t>
+              <a:t>4/6/17</a:t>
             </a:fld>
             <a:endParaRPr lang="en-US"/>
           </a:p>
@@ -3873,6 +3879,857 @@
 </p:sld>
 </file>
 
+<file path=ppt/slides/slide2.xml><?xml version="1.0" encoding="utf-8"?>
+<p:sld xmlns:a="http://schemas.openxmlformats.org/drawingml/2006/main" xmlns:r="http://schemas.openxmlformats.org/officeDocument/2006/relationships" xmlns:p="http://schemas.openxmlformats.org/presentationml/2006/main">
+  <p:cSld>
+    <p:spTree>
+      <p:nvGrpSpPr>
+        <p:cNvPr id="1" name=""/>
+        <p:cNvGrpSpPr/>
+        <p:nvPr/>
+      </p:nvGrpSpPr>
+      <p:grpSpPr>
+        <a:xfrm>
+          <a:off x="0" y="0"/>
+          <a:ext cx="0" cy="0"/>
+          <a:chOff x="0" y="0"/>
+          <a:chExt cx="0" cy="0"/>
+        </a:xfrm>
+      </p:grpSpPr>
+      <p:pic>
+        <p:nvPicPr>
+          <p:cNvPr id="18" name="Picture 17"/>
+          <p:cNvPicPr>
+            <a:picLocks noChangeAspect="1"/>
+          </p:cNvPicPr>
+          <p:nvPr/>
+        </p:nvPicPr>
+        <p:blipFill>
+          <a:blip r:embed="rId2" cstate="print">
+            <a:extLst>
+              <a:ext uri="{28A0092B-C50C-407E-A947-70E740481C1C}">
+                <a14:useLocalDpi xmlns:a14="http://schemas.microsoft.com/office/drawing/2010/main" val="0"/>
+              </a:ext>
+            </a:extLst>
+          </a:blip>
+          <a:stretch>
+            <a:fillRect/>
+          </a:stretch>
+        </p:blipFill>
+        <p:spPr>
+          <a:xfrm>
+            <a:off x="2387083" y="1491328"/>
+            <a:ext cx="2240183" cy="2903067"/>
+          </a:xfrm>
+          <a:prstGeom prst="rect">
+            <a:avLst/>
+          </a:prstGeom>
+        </p:spPr>
+      </p:pic>
+      <p:pic>
+        <p:nvPicPr>
+          <p:cNvPr id="17" name="Picture 16"/>
+          <p:cNvPicPr>
+            <a:picLocks noChangeAspect="1"/>
+          </p:cNvPicPr>
+          <p:nvPr/>
+        </p:nvPicPr>
+        <p:blipFill>
+          <a:blip r:embed="rId2" cstate="print">
+            <a:extLst>
+              <a:ext uri="{28A0092B-C50C-407E-A947-70E740481C1C}">
+                <a14:useLocalDpi xmlns:a14="http://schemas.microsoft.com/office/drawing/2010/main" val="0"/>
+              </a:ext>
+            </a:extLst>
+          </a:blip>
+          <a:stretch>
+            <a:fillRect/>
+          </a:stretch>
+        </p:blipFill>
+        <p:spPr>
+          <a:xfrm>
+            <a:off x="3501439" y="2131527"/>
+            <a:ext cx="2240183" cy="2903067"/>
+          </a:xfrm>
+          <a:prstGeom prst="rect">
+            <a:avLst/>
+          </a:prstGeom>
+        </p:spPr>
+      </p:pic>
+      <p:sp>
+        <p:nvSpPr>
+          <p:cNvPr id="3" name="Rectangle 2"/>
+          <p:cNvSpPr/>
+          <p:nvPr/>
+        </p:nvSpPr>
+        <p:spPr>
+          <a:xfrm>
+            <a:off x="1686880" y="1223136"/>
+            <a:ext cx="4645035" cy="3945579"/>
+          </a:xfrm>
+          <a:prstGeom prst="rect">
+            <a:avLst/>
+          </a:prstGeom>
+          <a:solidFill>
+            <a:srgbClr val="FFFFFF">
+              <a:alpha val="81176"/>
+            </a:srgbClr>
+          </a:solidFill>
+          <a:ln>
+            <a:noFill/>
+          </a:ln>
+          <a:effectLst/>
+        </p:spPr>
+        <p:style>
+          <a:lnRef idx="1">
+            <a:schemeClr val="accent1"/>
+          </a:lnRef>
+          <a:fillRef idx="3">
+            <a:schemeClr val="accent1"/>
+          </a:fillRef>
+          <a:effectRef idx="2">
+            <a:schemeClr val="accent1"/>
+          </a:effectRef>
+          <a:fontRef idx="minor">
+            <a:schemeClr val="lt1"/>
+          </a:fontRef>
+        </p:style>
+        <p:txBody>
+          <a:bodyPr rot="0" spcFirstLastPara="0" vertOverflow="overflow" horzOverflow="overflow" vert="horz" wrap="square" lIns="76200" tIns="38100" rIns="76200" bIns="38100" numCol="1" spcCol="0" rtlCol="0" fromWordArt="0" anchor="ctr" anchorCtr="0" forceAA="0" compatLnSpc="1">
+            <a:prstTxWarp prst="textNoShape">
+              <a:avLst/>
+            </a:prstTxWarp>
+            <a:noAutofit/>
+          </a:bodyPr>
+          <a:lstStyle/>
+          <a:p>
+            <a:pPr algn="ctr"/>
+            <a:endParaRPr lang="en-US" sz="1500"/>
+          </a:p>
+        </p:txBody>
+      </p:sp>
+      <p:cxnSp>
+        <p:nvCxnSpPr>
+          <p:cNvPr id="15" name="Straight Arrow Connector 14"/>
+          <p:cNvCxnSpPr/>
+          <p:nvPr/>
+        </p:nvCxnSpPr>
+        <p:spPr>
+          <a:xfrm flipH="1">
+            <a:off x="3646179" y="5024567"/>
+            <a:ext cx="1978964" cy="12757"/>
+          </a:xfrm>
+          <a:prstGeom prst="straightConnector1">
+            <a:avLst/>
+          </a:prstGeom>
+          <a:ln>
+            <a:solidFill>
+              <a:srgbClr val="C00000"/>
+            </a:solidFill>
+            <a:prstDash val="sysDot"/>
+            <a:tailEnd type="triangle"/>
+          </a:ln>
+          <a:effectLst/>
+        </p:spPr>
+        <p:style>
+          <a:lnRef idx="2">
+            <a:schemeClr val="accent1"/>
+          </a:lnRef>
+          <a:fillRef idx="0">
+            <a:schemeClr val="accent1"/>
+          </a:fillRef>
+          <a:effectRef idx="1">
+            <a:schemeClr val="accent1"/>
+          </a:effectRef>
+          <a:fontRef idx="minor">
+            <a:schemeClr val="tx1"/>
+          </a:fontRef>
+        </p:style>
+      </p:cxnSp>
+      <p:sp>
+        <p:nvSpPr>
+          <p:cNvPr id="2" name="Title 1"/>
+          <p:cNvSpPr>
+            <a:spLocks noGrp="1"/>
+          </p:cNvSpPr>
+          <p:nvPr>
+            <p:ph type="title"/>
+          </p:nvPr>
+        </p:nvSpPr>
+        <p:spPr/>
+        <p:txBody>
+          <a:bodyPr/>
+          <a:lstStyle/>
+          <a:p>
+            <a:r>
+              <a:rPr lang="en-US" dirty="0" smtClean="0"/>
+              <a:t>Redis</a:t>
+            </a:r>
+            <a:r>
+              <a:rPr lang="en-US" baseline="30000" dirty="0" smtClean="0"/>
+              <a:t>e</a:t>
+            </a:r>
+            <a:r>
+              <a:rPr lang="en-US" dirty="0" smtClean="0"/>
+              <a:t>  Technology </a:t>
+            </a:r>
+            <a:r>
+              <a:rPr lang="mr-IN" dirty="0" smtClean="0"/>
+              <a:t>–</a:t>
+            </a:r>
+            <a:r>
+              <a:rPr lang="en-US" dirty="0" smtClean="0"/>
+              <a:t> Node Architecture</a:t>
+            </a:r>
+            <a:endParaRPr lang="en-US" dirty="0"/>
+          </a:p>
+        </p:txBody>
+      </p:sp>
+      <p:sp>
+        <p:nvSpPr>
+          <p:cNvPr id="4" name="Shape 67"/>
+          <p:cNvSpPr txBox="1"/>
+          <p:nvPr/>
+        </p:nvSpPr>
+        <p:spPr>
+          <a:xfrm>
+            <a:off x="7619044" y="1960310"/>
+            <a:ext cx="3272432" cy="511452"/>
+          </a:xfrm>
+          <a:prstGeom prst="rect">
+            <a:avLst/>
+          </a:prstGeom>
+          <a:noFill/>
+          <a:ln>
+            <a:noFill/>
+          </a:ln>
+        </p:spPr>
+        <p:txBody>
+          <a:bodyPr lIns="76167" tIns="38067" rIns="76167" bIns="38067" anchor="t" anchorCtr="0">
+            <a:noAutofit/>
+          </a:bodyPr>
+          <a:lstStyle/>
+          <a:p>
+            <a:pPr defTabSz="1088403">
+              <a:lnSpc>
+                <a:spcPct val="90000"/>
+              </a:lnSpc>
+              <a:buClr>
+                <a:srgbClr val="000000"/>
+              </a:buClr>
+              <a:buSzPct val="25000"/>
+            </a:pPr>
+            <a:r>
+              <a:rPr lang="en" sz="3200" b="1" dirty="0">
+                <a:solidFill>
+                  <a:srgbClr val="5F5F5F"/>
+                </a:solidFill>
+                <a:ea typeface="Tahoma"/>
+                <a:cs typeface="Tahoma"/>
+                <a:sym typeface="Tahoma"/>
+                <a:rtl val="0"/>
+              </a:rPr>
+              <a:t>Redis</a:t>
+            </a:r>
+            <a:r>
+              <a:rPr lang="en" sz="3200" b="1" baseline="30000" dirty="0">
+                <a:solidFill>
+                  <a:srgbClr val="5F5F5F"/>
+                </a:solidFill>
+                <a:ea typeface="Tahoma"/>
+                <a:cs typeface="Tahoma"/>
+                <a:sym typeface="Tahoma"/>
+                <a:rtl val="0"/>
+              </a:rPr>
+              <a:t>e</a:t>
+            </a:r>
+            <a:r>
+              <a:rPr lang="en" sz="3200" b="1" dirty="0">
+                <a:solidFill>
+                  <a:srgbClr val="5F5F5F"/>
+                </a:solidFill>
+                <a:ea typeface="Tahoma"/>
+                <a:cs typeface="Tahoma"/>
+                <a:sym typeface="Tahoma"/>
+                <a:rtl val="0"/>
+              </a:rPr>
+              <a:t> </a:t>
+            </a:r>
+            <a:r>
+              <a:rPr lang="en-US" sz="3200" b="1" dirty="0">
+                <a:solidFill>
+                  <a:srgbClr val="5F5F5F"/>
+                </a:solidFill>
+                <a:ea typeface="Tahoma"/>
+                <a:cs typeface="Tahoma"/>
+                <a:sym typeface="Tahoma"/>
+                <a:rtl val="0"/>
+              </a:rPr>
+              <a:t>Pack </a:t>
+            </a:r>
+            <a:endParaRPr lang="en-US" sz="3200" b="1" dirty="0" smtClean="0">
+              <a:solidFill>
+                <a:srgbClr val="5F5F5F"/>
+              </a:solidFill>
+              <a:ea typeface="Tahoma"/>
+              <a:cs typeface="Tahoma"/>
+              <a:sym typeface="Tahoma"/>
+              <a:rtl val="0"/>
+            </a:endParaRPr>
+          </a:p>
+          <a:p>
+            <a:pPr defTabSz="1088403">
+              <a:lnSpc>
+                <a:spcPct val="90000"/>
+              </a:lnSpc>
+              <a:buClr>
+                <a:srgbClr val="000000"/>
+              </a:buClr>
+              <a:buSzPct val="25000"/>
+            </a:pPr>
+            <a:r>
+              <a:rPr lang="en" sz="2000" dirty="0" smtClean="0">
+                <a:solidFill>
+                  <a:srgbClr val="5F5F5F"/>
+                </a:solidFill>
+                <a:ea typeface="Tahoma"/>
+                <a:cs typeface="Tahoma"/>
+                <a:sym typeface="Tahoma"/>
+                <a:rtl val="0"/>
+              </a:rPr>
+              <a:t>Node</a:t>
+            </a:r>
+            <a:r>
+              <a:rPr lang="en-US" sz="2000" dirty="0" smtClean="0">
+                <a:solidFill>
+                  <a:srgbClr val="5F5F5F"/>
+                </a:solidFill>
+                <a:ea typeface="Tahoma"/>
+                <a:cs typeface="Tahoma"/>
+                <a:sym typeface="Tahoma"/>
+                <a:rtl val="0"/>
+              </a:rPr>
+              <a:t> Architecture</a:t>
+            </a:r>
+            <a:endParaRPr lang="en" sz="2000" dirty="0">
+              <a:solidFill>
+                <a:srgbClr val="5F5F5F"/>
+              </a:solidFill>
+              <a:ea typeface="Tahoma"/>
+              <a:cs typeface="Tahoma"/>
+              <a:sym typeface="Tahoma"/>
+              <a:rtl val="0"/>
+            </a:endParaRPr>
+          </a:p>
+        </p:txBody>
+      </p:sp>
+      <p:sp>
+        <p:nvSpPr>
+          <p:cNvPr id="16" name="TextBox 15"/>
+          <p:cNvSpPr txBox="1"/>
+          <p:nvPr/>
+        </p:nvSpPr>
+        <p:spPr>
+          <a:xfrm>
+            <a:off x="7988957" y="3372640"/>
+            <a:ext cx="3035035" cy="1007968"/>
+          </a:xfrm>
+          <a:prstGeom prst="rect">
+            <a:avLst/>
+          </a:prstGeom>
+          <a:noFill/>
+        </p:spPr>
+        <p:txBody>
+          <a:bodyPr wrap="square" rtlCol="0">
+            <a:spAutoFit/>
+          </a:bodyPr>
+          <a:lstStyle/>
+          <a:p>
+            <a:pPr defTabSz="1088403"/>
+            <a:r>
+              <a:rPr lang="en-US" sz="2800" dirty="0">
+                <a:solidFill>
+                  <a:srgbClr val="000000">
+                    <a:lumMod val="50000"/>
+                    <a:lumOff val="50000"/>
+                  </a:srgbClr>
+                </a:solidFill>
+              </a:rPr>
+              <a:t>Cluster </a:t>
+            </a:r>
+            <a:r>
+              <a:rPr lang="en-US" sz="2800" dirty="0">
+                <a:solidFill>
+                  <a:srgbClr val="000000">
+                    <a:lumMod val="50000"/>
+                    <a:lumOff val="50000"/>
+                  </a:srgbClr>
+                </a:solidFill>
+              </a:rPr>
+              <a:t>Manager</a:t>
+            </a:r>
+          </a:p>
+          <a:p>
+            <a:pPr defTabSz="1088403"/>
+            <a:r>
+              <a:rPr lang="en-US" sz="1050" dirty="0">
+                <a:solidFill>
+                  <a:srgbClr val="000000">
+                    <a:lumMod val="50000"/>
+                    <a:lumOff val="50000"/>
+                  </a:srgbClr>
+                </a:solidFill>
+                <a:latin typeface="Consolas" charset="0"/>
+                <a:ea typeface="Consolas" charset="0"/>
+                <a:cs typeface="Consolas" charset="0"/>
+              </a:rPr>
+              <a:t>Govern Cluster, Orchestrate Failure Detection, Failover, Stats Collection &amp; more</a:t>
+            </a:r>
+            <a:endParaRPr lang="en-US" sz="1050" dirty="0">
+              <a:solidFill>
+                <a:srgbClr val="000000">
+                  <a:lumMod val="50000"/>
+                  <a:lumOff val="50000"/>
+                </a:srgbClr>
+              </a:solidFill>
+              <a:latin typeface="Consolas" charset="0"/>
+              <a:ea typeface="Consolas" charset="0"/>
+              <a:cs typeface="Consolas" charset="0"/>
+            </a:endParaRPr>
+          </a:p>
+        </p:txBody>
+      </p:sp>
+      <p:sp>
+        <p:nvSpPr>
+          <p:cNvPr id="9" name="Shape 67"/>
+          <p:cNvSpPr txBox="1"/>
+          <p:nvPr/>
+        </p:nvSpPr>
+        <p:spPr>
+          <a:xfrm>
+            <a:off x="1547046" y="4935566"/>
+            <a:ext cx="2158933" cy="684803"/>
+          </a:xfrm>
+          <a:prstGeom prst="rect">
+            <a:avLst/>
+          </a:prstGeom>
+          <a:noFill/>
+        </p:spPr>
+        <p:txBody>
+          <a:bodyPr wrap="square" rtlCol="0">
+            <a:spAutoFit/>
+          </a:bodyPr>
+          <a:lstStyle>
+            <a:defPPr marR="0" lvl="0" algn="l" rtl="0">
+              <a:lnSpc>
+                <a:spcPct val="100000"/>
+              </a:lnSpc>
+              <a:spcBef>
+                <a:spcPts val="0"/>
+              </a:spcBef>
+              <a:spcAft>
+                <a:spcPts val="0"/>
+              </a:spcAft>
+            </a:defPPr>
+            <a:lvl1pPr defTabSz="816356">
+              <a:defRPr sz="1500">
+                <a:solidFill>
+                  <a:srgbClr val="000000">
+                    <a:lumMod val="50000"/>
+                    <a:lumOff val="50000"/>
+                  </a:srgbClr>
+                </a:solidFill>
+              </a:defRPr>
+            </a:lvl1pPr>
+          </a:lstStyle>
+          <a:p>
+            <a:pPr algn="r"/>
+            <a:r>
+              <a:rPr lang="en-US" sz="2800" dirty="0">
+                <a:sym typeface="Tahoma"/>
+              </a:rPr>
+              <a:t>Redis</a:t>
+            </a:r>
+            <a:r>
+              <a:rPr lang="en-US" sz="2800" baseline="30000" dirty="0">
+                <a:sym typeface="Tahoma"/>
+              </a:rPr>
+              <a:t>e</a:t>
+            </a:r>
+            <a:r>
+              <a:rPr lang="en-US" sz="2800" dirty="0">
+                <a:sym typeface="Tahoma"/>
+              </a:rPr>
+              <a:t> Shards</a:t>
+            </a:r>
+          </a:p>
+          <a:p>
+            <a:pPr algn="r"/>
+            <a:r>
+              <a:rPr lang="en-US" sz="1050" i="1" dirty="0">
+                <a:latin typeface="Consolas" charset="0"/>
+                <a:ea typeface="Consolas" charset="0"/>
+                <a:cs typeface="Consolas" charset="0"/>
+                <a:sym typeface="Tahoma"/>
+              </a:rPr>
+              <a:t>Based on Open Source Redis</a:t>
+            </a:r>
+            <a:endParaRPr lang="en" sz="1050" i="1" dirty="0">
+              <a:latin typeface="Consolas" charset="0"/>
+              <a:ea typeface="Consolas" charset="0"/>
+              <a:cs typeface="Consolas" charset="0"/>
+              <a:sym typeface="Tahoma"/>
+            </a:endParaRPr>
+          </a:p>
+        </p:txBody>
+      </p:sp>
+      <p:sp>
+        <p:nvSpPr>
+          <p:cNvPr id="24" name="TextBox 23"/>
+          <p:cNvSpPr txBox="1"/>
+          <p:nvPr/>
+        </p:nvSpPr>
+        <p:spPr>
+          <a:xfrm>
+            <a:off x="7792360" y="4409296"/>
+            <a:ext cx="3694649" cy="1277273"/>
+          </a:xfrm>
+          <a:prstGeom prst="rect">
+            <a:avLst/>
+          </a:prstGeom>
+          <a:noFill/>
+        </p:spPr>
+        <p:txBody>
+          <a:bodyPr wrap="square" rtlCol="0">
+            <a:spAutoFit/>
+          </a:bodyPr>
+          <a:lstStyle/>
+          <a:p>
+            <a:pPr defTabSz="1088403"/>
+            <a:r>
+              <a:rPr lang="en-US" sz="2800" dirty="0">
+                <a:solidFill>
+                  <a:srgbClr val="000000">
+                    <a:lumMod val="50000"/>
+                    <a:lumOff val="50000"/>
+                  </a:srgbClr>
+                </a:solidFill>
+              </a:rPr>
+              <a:t>Secure UI &amp; REST API</a:t>
+            </a:r>
+          </a:p>
+          <a:p>
+            <a:pPr defTabSz="1088403"/>
+            <a:r>
+              <a:rPr lang="en-US" sz="1050" dirty="0">
+                <a:solidFill>
+                  <a:srgbClr val="000000">
+                    <a:lumMod val="50000"/>
+                    <a:lumOff val="50000"/>
+                  </a:srgbClr>
+                </a:solidFill>
+                <a:latin typeface="Consolas" charset="0"/>
+                <a:ea typeface="Consolas" charset="0"/>
+                <a:cs typeface="Consolas" charset="0"/>
+              </a:rPr>
+              <a:t>Allow programmable and visual administration over HTTPS</a:t>
+            </a:r>
+          </a:p>
+          <a:p>
+            <a:pPr defTabSz="1088403"/>
+            <a:endParaRPr lang="en-US" sz="2800" dirty="0">
+              <a:solidFill>
+                <a:srgbClr val="000000">
+                  <a:lumMod val="50000"/>
+                  <a:lumOff val="50000"/>
+                </a:srgbClr>
+              </a:solidFill>
+            </a:endParaRPr>
+          </a:p>
+        </p:txBody>
+      </p:sp>
+      <p:sp>
+        <p:nvSpPr>
+          <p:cNvPr id="25" name="TextBox 24"/>
+          <p:cNvSpPr txBox="1"/>
+          <p:nvPr/>
+        </p:nvSpPr>
+        <p:spPr>
+          <a:xfrm>
+            <a:off x="148536" y="3636740"/>
+            <a:ext cx="2695761" cy="846386"/>
+          </a:xfrm>
+          <a:prstGeom prst="rect">
+            <a:avLst/>
+          </a:prstGeom>
+          <a:noFill/>
+        </p:spPr>
+        <p:txBody>
+          <a:bodyPr wrap="square" rtlCol="0">
+            <a:spAutoFit/>
+          </a:bodyPr>
+          <a:lstStyle/>
+          <a:p>
+            <a:pPr algn="r" defTabSz="1088403"/>
+            <a:r>
+              <a:rPr lang="en-US" sz="2800" dirty="0">
+                <a:solidFill>
+                  <a:srgbClr val="000000">
+                    <a:lumMod val="50000"/>
+                    <a:lumOff val="50000"/>
+                  </a:srgbClr>
+                </a:solidFill>
+              </a:rPr>
+              <a:t>Proxy</a:t>
+            </a:r>
+          </a:p>
+          <a:p>
+            <a:pPr algn="r" defTabSz="1088403"/>
+            <a:r>
+              <a:rPr lang="en-US" sz="1050" i="1" dirty="0">
+                <a:solidFill>
+                  <a:srgbClr val="000000">
+                    <a:lumMod val="50000"/>
+                    <a:lumOff val="50000"/>
+                  </a:srgbClr>
+                </a:solidFill>
+                <a:latin typeface="Consolas" charset="0"/>
+                <a:ea typeface="Consolas" charset="0"/>
+                <a:cs typeface="Consolas" charset="0"/>
+              </a:rPr>
+              <a:t>Scale Connections &amp; </a:t>
+            </a:r>
+          </a:p>
+          <a:p>
+            <a:pPr algn="r" defTabSz="1088403"/>
+            <a:r>
+              <a:rPr lang="en-US" sz="1050" i="1" dirty="0">
+                <a:solidFill>
+                  <a:srgbClr val="000000">
+                    <a:lumMod val="50000"/>
+                    <a:lumOff val="50000"/>
+                  </a:srgbClr>
+                </a:solidFill>
+                <a:latin typeface="Consolas" charset="0"/>
+                <a:ea typeface="Consolas" charset="0"/>
+                <a:cs typeface="Consolas" charset="0"/>
+              </a:rPr>
+              <a:t>Improve Application Performance</a:t>
+            </a:r>
+            <a:endParaRPr lang="en-US" sz="1050" i="1" dirty="0">
+              <a:solidFill>
+                <a:srgbClr val="000000">
+                  <a:lumMod val="50000"/>
+                  <a:lumOff val="50000"/>
+                </a:srgbClr>
+              </a:solidFill>
+              <a:latin typeface="Consolas" charset="0"/>
+              <a:ea typeface="Consolas" charset="0"/>
+              <a:cs typeface="Consolas" charset="0"/>
+            </a:endParaRPr>
+          </a:p>
+        </p:txBody>
+      </p:sp>
+      <p:pic>
+        <p:nvPicPr>
+          <p:cNvPr id="22" name="Picture 21"/>
+          <p:cNvPicPr>
+            <a:picLocks noChangeAspect="1"/>
+          </p:cNvPicPr>
+          <p:nvPr/>
+        </p:nvPicPr>
+        <p:blipFill>
+          <a:blip r:embed="rId2" cstate="print">
+            <a:extLst>
+              <a:ext uri="{28A0092B-C50C-407E-A947-70E740481C1C}">
+                <a14:useLocalDpi xmlns:a14="http://schemas.microsoft.com/office/drawing/2010/main" val="0"/>
+              </a:ext>
+            </a:extLst>
+          </a:blip>
+          <a:stretch>
+            <a:fillRect/>
+          </a:stretch>
+        </p:blipFill>
+        <p:spPr>
+          <a:xfrm>
+            <a:off x="4613259" y="2781857"/>
+            <a:ext cx="2240183" cy="2903067"/>
+          </a:xfrm>
+          <a:prstGeom prst="rect">
+            <a:avLst/>
+          </a:prstGeom>
+        </p:spPr>
+      </p:pic>
+      <p:cxnSp>
+        <p:nvCxnSpPr>
+          <p:cNvPr id="13" name="Straight Arrow Connector 12"/>
+          <p:cNvCxnSpPr/>
+          <p:nvPr/>
+        </p:nvCxnSpPr>
+        <p:spPr>
+          <a:xfrm flipH="1">
+            <a:off x="2953092" y="4045229"/>
+            <a:ext cx="2331316" cy="15028"/>
+          </a:xfrm>
+          <a:prstGeom prst="straightConnector1">
+            <a:avLst/>
+          </a:prstGeom>
+          <a:ln>
+            <a:prstDash val="sysDot"/>
+            <a:tailEnd type="triangle"/>
+          </a:ln>
+          <a:effectLst/>
+        </p:spPr>
+        <p:style>
+          <a:lnRef idx="2">
+            <a:schemeClr val="accent1"/>
+          </a:lnRef>
+          <a:fillRef idx="0">
+            <a:schemeClr val="accent1"/>
+          </a:fillRef>
+          <a:effectRef idx="1">
+            <a:schemeClr val="accent1"/>
+          </a:effectRef>
+          <a:fontRef idx="minor">
+            <a:schemeClr val="tx1"/>
+          </a:fontRef>
+        </p:style>
+      </p:cxnSp>
+      <p:cxnSp>
+        <p:nvCxnSpPr>
+          <p:cNvPr id="30" name="Straight Arrow Connector 29"/>
+          <p:cNvCxnSpPr/>
+          <p:nvPr/>
+        </p:nvCxnSpPr>
+        <p:spPr>
+          <a:xfrm>
+            <a:off x="5987001" y="3845360"/>
+            <a:ext cx="1883258" cy="0"/>
+          </a:xfrm>
+          <a:prstGeom prst="straightConnector1">
+            <a:avLst/>
+          </a:prstGeom>
+          <a:ln>
+            <a:prstDash val="sysDot"/>
+            <a:tailEnd type="triangle"/>
+          </a:ln>
+          <a:effectLst/>
+        </p:spPr>
+        <p:style>
+          <a:lnRef idx="2">
+            <a:schemeClr val="accent1"/>
+          </a:lnRef>
+          <a:fillRef idx="0">
+            <a:schemeClr val="accent1"/>
+          </a:fillRef>
+          <a:effectRef idx="1">
+            <a:schemeClr val="accent1"/>
+          </a:effectRef>
+          <a:fontRef idx="minor">
+            <a:schemeClr val="tx1"/>
+          </a:fontRef>
+        </p:style>
+      </p:cxnSp>
+      <p:cxnSp>
+        <p:nvCxnSpPr>
+          <p:cNvPr id="31" name="Straight Arrow Connector 30"/>
+          <p:cNvCxnSpPr/>
+          <p:nvPr/>
+        </p:nvCxnSpPr>
+        <p:spPr>
+          <a:xfrm flipV="1">
+            <a:off x="5788421" y="4618586"/>
+            <a:ext cx="1830623" cy="5763"/>
+          </a:xfrm>
+          <a:prstGeom prst="straightConnector1">
+            <a:avLst/>
+          </a:prstGeom>
+          <a:ln>
+            <a:prstDash val="sysDot"/>
+            <a:tailEnd type="triangle"/>
+          </a:ln>
+          <a:effectLst/>
+        </p:spPr>
+        <p:style>
+          <a:lnRef idx="2">
+            <a:schemeClr val="accent1"/>
+          </a:lnRef>
+          <a:fillRef idx="0">
+            <a:schemeClr val="accent1"/>
+          </a:fillRef>
+          <a:effectRef idx="1">
+            <a:schemeClr val="accent1"/>
+          </a:effectRef>
+          <a:fontRef idx="minor">
+            <a:schemeClr val="tx1"/>
+          </a:fontRef>
+        </p:style>
+      </p:cxnSp>
+      <p:cxnSp>
+        <p:nvCxnSpPr>
+          <p:cNvPr id="19" name="Straight Connector 18"/>
+          <p:cNvCxnSpPr/>
+          <p:nvPr/>
+        </p:nvCxnSpPr>
+        <p:spPr>
+          <a:xfrm flipV="1">
+            <a:off x="6491279" y="2557859"/>
+            <a:ext cx="1127765" cy="661065"/>
+          </a:xfrm>
+          <a:prstGeom prst="line">
+            <a:avLst/>
+          </a:prstGeom>
+          <a:ln>
+            <a:prstDash val="sysDot"/>
+          </a:ln>
+        </p:spPr>
+        <p:style>
+          <a:lnRef idx="1">
+            <a:schemeClr val="accent1"/>
+          </a:lnRef>
+          <a:fillRef idx="0">
+            <a:schemeClr val="accent1"/>
+          </a:fillRef>
+          <a:effectRef idx="0">
+            <a:schemeClr val="accent1"/>
+          </a:effectRef>
+          <a:fontRef idx="minor">
+            <a:schemeClr val="tx1"/>
+          </a:fontRef>
+        </p:style>
+      </p:cxnSp>
+    </p:spTree>
+    <p:extLst>
+      <p:ext uri="{BB962C8B-B14F-4D97-AF65-F5344CB8AC3E}">
+        <p14:creationId xmlns:p14="http://schemas.microsoft.com/office/powerpoint/2010/main" val="344919370"/>
+      </p:ext>
+    </p:extLst>
+  </p:cSld>
+  <p:clrMapOvr>
+    <a:masterClrMapping/>
+  </p:clrMapOvr>
+  <mc:AlternateContent xmlns:mc="http://schemas.openxmlformats.org/markup-compatibility/2006" xmlns:p14="http://schemas.microsoft.com/office/powerpoint/2010/main">
+    <mc:Choice Requires="p14">
+      <p:transition spd="med" p14:dur="700">
+        <p:fade/>
+      </p:transition>
+    </mc:Choice>
+    <mc:Fallback xmlns="">
+      <p:transition spd="med">
+        <p:fade/>
+      </p:transition>
+    </mc:Fallback>
+  </mc:AlternateContent>
+  <p:timing>
+    <p:tnLst>
+      <p:par>
+        <p:cTn id="1" dur="indefinite" restart="never" nodeType="tmRoot"/>
+      </p:par>
+    </p:tnLst>
+  </p:timing>
+</p:sld>
+</file>
+
 <file path=ppt/theme/theme1.xml><?xml version="1.0" encoding="utf-8"?>
 <a:theme xmlns:a="http://schemas.openxmlformats.org/drawingml/2006/main" name="Office Theme">
   <a:themeElements>

</xml_diff>